<commit_message>
update template empty files
</commit_message>
<xml_diff>
--- a/assets/cs/new.pptx
+++ b/assets/cs/new.pptx
@@ -562,7 +562,7 @@
 
 <file path=ppt/slideLayouts/slideLayout1.xml><?xml version="1.0" encoding="utf-8"?>
 <p:sldLayout xmlns:a="http://schemas.openxmlformats.org/drawingml/2006/main" xmlns:r="http://schemas.openxmlformats.org/officeDocument/2006/relationships" xmlns:p="http://schemas.openxmlformats.org/presentationml/2006/main" type="title" preserve="1">
-  <p:cSld name="Title Slide">
+  <p:cSld name="Úvodní snímek">
     <p:spTree>
       <p:nvGrpSpPr>
         <p:cNvPr id="1" name=""/>
@@ -579,7 +579,7 @@
       </p:grpSpPr>
       <p:sp>
         <p:nvSpPr>
-          <p:cNvPr id="2" name="Title 1"/>
+          <p:cNvPr id="2" name="Nadpis 1"/>
           <p:cNvSpPr>
             <a:spLocks noGrp="1"/>
           </p:cNvSpPr>
@@ -603,7 +603,7 @@
           <a:p>
             <a:r>
               <a:rPr lang="cs-CZ" smtClean="0"/>
-              <a:t>Click to edit Master title style</a:t>
+              <a:t>Kliknutím lze upravit styl</a:t>
             </a:r>
             <a:endParaRPr lang="cs-CZ" dirty="0"/>
           </a:p>
@@ -611,7 +611,7 @@
       </p:sp>
       <p:sp>
         <p:nvSpPr>
-          <p:cNvPr id="3" name="Subtitle 2"/>
+          <p:cNvPr id="3" name="Podnadpis 2"/>
           <p:cNvSpPr>
             <a:spLocks noGrp="1"/>
           </p:cNvSpPr>
@@ -668,7 +668,7 @@
           <a:p>
             <a:r>
               <a:rPr lang="cs-CZ" smtClean="0"/>
-              <a:t>Click to edit Master subtitle style</a:t>
+              <a:t>Kliknutím lze upravit styl předlohy</a:t>
             </a:r>
             <a:endParaRPr lang="cs-CZ" dirty="0"/>
           </a:p>
@@ -676,7 +676,7 @@
       </p:sp>
       <p:sp>
         <p:nvSpPr>
-          <p:cNvPr id="4" name="Date Placeholder 3"/>
+          <p:cNvPr id="4" name="Zástupný symbol pro datum 3"/>
           <p:cNvSpPr>
             <a:spLocks noGrp="1"/>
           </p:cNvSpPr>
@@ -699,7 +699,7 @@
       </p:sp>
       <p:sp>
         <p:nvSpPr>
-          <p:cNvPr id="5" name="Footer Placeholder 4"/>
+          <p:cNvPr id="5" name="Zástupný symbol pro zápatí 4"/>
           <p:cNvSpPr>
             <a:spLocks noGrp="1"/>
           </p:cNvSpPr>
@@ -718,7 +718,7 @@
       </p:sp>
       <p:sp>
         <p:nvSpPr>
-          <p:cNvPr id="6" name="Slide Number Placeholder 5"/>
+          <p:cNvPr id="6" name="Zástupný symbol pro číslo snímku 5"/>
           <p:cNvSpPr>
             <a:spLocks noGrp="1"/>
           </p:cNvSpPr>
@@ -754,7 +754,7 @@
 
 <file path=ppt/slideLayouts/slideLayout10.xml><?xml version="1.0" encoding="utf-8"?>
 <p:sldLayout xmlns:a="http://schemas.openxmlformats.org/drawingml/2006/main" xmlns:r="http://schemas.openxmlformats.org/officeDocument/2006/relationships" xmlns:p="http://schemas.openxmlformats.org/presentationml/2006/main" type="vertTx" preserve="1">
-  <p:cSld name="Title and Vertical Text">
+  <p:cSld name="Nadpis a svislý text">
     <p:spTree>
       <p:nvGrpSpPr>
         <p:cNvPr id="1" name=""/>
@@ -771,7 +771,7 @@
       </p:grpSpPr>
       <p:sp>
         <p:nvSpPr>
-          <p:cNvPr id="2" name="Title 1"/>
+          <p:cNvPr id="2" name="Nadpis 1"/>
           <p:cNvSpPr>
             <a:spLocks noGrp="1"/>
           </p:cNvSpPr>
@@ -786,7 +786,7 @@
           <a:p>
             <a:r>
               <a:rPr lang="cs-CZ" smtClean="0"/>
-              <a:t>Click to edit Master title style</a:t>
+              <a:t>Kliknutím lze upravit styl</a:t>
             </a:r>
             <a:endParaRPr lang="cs-CZ" dirty="0"/>
           </a:p>
@@ -794,7 +794,7 @@
       </p:sp>
       <p:sp>
         <p:nvSpPr>
-          <p:cNvPr id="3" name="Vertical Text Placeholder 2"/>
+          <p:cNvPr id="3" name="Zástupný symbol pro svislý text 2"/>
           <p:cNvSpPr>
             <a:spLocks noGrp="1"/>
           </p:cNvSpPr>
@@ -810,35 +810,35 @@
             <a:pPr lvl="0"/>
             <a:r>
               <a:rPr lang="cs-CZ" smtClean="0"/>
-              <a:t>Click to edit Master text styles</a:t>
+              <a:t>Kliknutím lze upravit styly předlohy textu</a:t>
             </a:r>
           </a:p>
           <a:p>
             <a:pPr lvl="1"/>
             <a:r>
               <a:rPr lang="cs-CZ" smtClean="0"/>
-              <a:t>Second level</a:t>
+              <a:t>Druhá úroveň</a:t>
             </a:r>
           </a:p>
           <a:p>
             <a:pPr lvl="2"/>
             <a:r>
               <a:rPr lang="cs-CZ" smtClean="0"/>
-              <a:t>Third level</a:t>
+              <a:t>Třetí úroveň</a:t>
             </a:r>
           </a:p>
           <a:p>
             <a:pPr lvl="3"/>
             <a:r>
               <a:rPr lang="cs-CZ" smtClean="0"/>
-              <a:t>Fourth level</a:t>
+              <a:t>Čtvrtá úroveň</a:t>
             </a:r>
           </a:p>
           <a:p>
             <a:pPr lvl="4"/>
             <a:r>
               <a:rPr lang="cs-CZ" smtClean="0"/>
-              <a:t>Fifth level</a:t>
+              <a:t>Pátá úroveň</a:t>
             </a:r>
             <a:endParaRPr lang="cs-CZ" dirty="0"/>
           </a:p>
@@ -846,7 +846,7 @@
       </p:sp>
       <p:sp>
         <p:nvSpPr>
-          <p:cNvPr id="4" name="Date Placeholder 3"/>
+          <p:cNvPr id="4" name="Zástupný symbol pro datum 3"/>
           <p:cNvSpPr>
             <a:spLocks noGrp="1"/>
           </p:cNvSpPr>
@@ -869,7 +869,7 @@
       </p:sp>
       <p:sp>
         <p:nvSpPr>
-          <p:cNvPr id="5" name="Footer Placeholder 4"/>
+          <p:cNvPr id="5" name="Zástupný symbol pro zápatí 4"/>
           <p:cNvSpPr>
             <a:spLocks noGrp="1"/>
           </p:cNvSpPr>
@@ -888,7 +888,7 @@
       </p:sp>
       <p:sp>
         <p:nvSpPr>
-          <p:cNvPr id="6" name="Slide Number Placeholder 5"/>
+          <p:cNvPr id="6" name="Zástupný symbol pro číslo snímku 5"/>
           <p:cNvSpPr>
             <a:spLocks noGrp="1"/>
           </p:cNvSpPr>
@@ -924,7 +924,7 @@
 
 <file path=ppt/slideLayouts/slideLayout11.xml><?xml version="1.0" encoding="utf-8"?>
 <p:sldLayout xmlns:a="http://schemas.openxmlformats.org/drawingml/2006/main" xmlns:r="http://schemas.openxmlformats.org/officeDocument/2006/relationships" xmlns:p="http://schemas.openxmlformats.org/presentationml/2006/main" type="vertTitleAndTx" preserve="1">
-  <p:cSld name="Vertical Title and Text">
+  <p:cSld name="Svislý nadpis a text">
     <p:spTree>
       <p:nvGrpSpPr>
         <p:cNvPr id="1" name=""/>
@@ -941,7 +941,7 @@
       </p:grpSpPr>
       <p:sp>
         <p:nvSpPr>
-          <p:cNvPr id="2" name="Vertical Title 1"/>
+          <p:cNvPr id="2" name="Svislý nadpis 1"/>
           <p:cNvSpPr>
             <a:spLocks noGrp="1"/>
           </p:cNvSpPr>
@@ -961,7 +961,7 @@
           <a:p>
             <a:r>
               <a:rPr lang="cs-CZ" smtClean="0"/>
-              <a:t>Click to edit Master title style</a:t>
+              <a:t>Kliknutím lze upravit styl</a:t>
             </a:r>
             <a:endParaRPr lang="cs-CZ" dirty="0"/>
           </a:p>
@@ -969,7 +969,7 @@
       </p:sp>
       <p:sp>
         <p:nvSpPr>
-          <p:cNvPr id="3" name="Vertical Text Placeholder 2"/>
+          <p:cNvPr id="3" name="Zástupný symbol pro svislý text 2"/>
           <p:cNvSpPr>
             <a:spLocks noGrp="1"/>
           </p:cNvSpPr>
@@ -990,35 +990,35 @@
             <a:pPr lvl="0"/>
             <a:r>
               <a:rPr lang="cs-CZ" smtClean="0"/>
-              <a:t>Click to edit Master text styles</a:t>
+              <a:t>Kliknutím lze upravit styly předlohy textu</a:t>
             </a:r>
           </a:p>
           <a:p>
             <a:pPr lvl="1"/>
             <a:r>
               <a:rPr lang="cs-CZ" smtClean="0"/>
-              <a:t>Second level</a:t>
+              <a:t>Druhá úroveň</a:t>
             </a:r>
           </a:p>
           <a:p>
             <a:pPr lvl="2"/>
             <a:r>
               <a:rPr lang="cs-CZ" smtClean="0"/>
-              <a:t>Third level</a:t>
+              <a:t>Třetí úroveň</a:t>
             </a:r>
           </a:p>
           <a:p>
             <a:pPr lvl="3"/>
             <a:r>
               <a:rPr lang="cs-CZ" smtClean="0"/>
-              <a:t>Fourth level</a:t>
+              <a:t>Čtvrtá úroveň</a:t>
             </a:r>
           </a:p>
           <a:p>
             <a:pPr lvl="4"/>
             <a:r>
               <a:rPr lang="cs-CZ" smtClean="0"/>
-              <a:t>Fifth level</a:t>
+              <a:t>Pátá úroveň</a:t>
             </a:r>
             <a:endParaRPr lang="cs-CZ" dirty="0"/>
           </a:p>
@@ -1026,7 +1026,7 @@
       </p:sp>
       <p:sp>
         <p:nvSpPr>
-          <p:cNvPr id="4" name="Date Placeholder 3"/>
+          <p:cNvPr id="4" name="Zástupný symbol pro datum 3"/>
           <p:cNvSpPr>
             <a:spLocks noGrp="1"/>
           </p:cNvSpPr>
@@ -1049,7 +1049,7 @@
       </p:sp>
       <p:sp>
         <p:nvSpPr>
-          <p:cNvPr id="5" name="Footer Placeholder 4"/>
+          <p:cNvPr id="5" name="Zástupný symbol pro zápatí 4"/>
           <p:cNvSpPr>
             <a:spLocks noGrp="1"/>
           </p:cNvSpPr>
@@ -1068,7 +1068,7 @@
       </p:sp>
       <p:sp>
         <p:nvSpPr>
-          <p:cNvPr id="6" name="Slide Number Placeholder 5"/>
+          <p:cNvPr id="6" name="Zástupný symbol pro číslo snímku 5"/>
           <p:cNvSpPr>
             <a:spLocks noGrp="1"/>
           </p:cNvSpPr>
@@ -1104,7 +1104,7 @@
 
 <file path=ppt/slideLayouts/slideLayout2.xml><?xml version="1.0" encoding="utf-8"?>
 <p:sldLayout xmlns:a="http://schemas.openxmlformats.org/drawingml/2006/main" xmlns:r="http://schemas.openxmlformats.org/officeDocument/2006/relationships" xmlns:p="http://schemas.openxmlformats.org/presentationml/2006/main" type="obj" preserve="1">
-  <p:cSld name="Title and Content">
+  <p:cSld name="Nadpis a obsah">
     <p:spTree>
       <p:nvGrpSpPr>
         <p:cNvPr id="1" name=""/>
@@ -1121,7 +1121,7 @@
       </p:grpSpPr>
       <p:sp>
         <p:nvSpPr>
-          <p:cNvPr id="2" name="Title 1"/>
+          <p:cNvPr id="2" name="Nadpis 1"/>
           <p:cNvSpPr>
             <a:spLocks noGrp="1"/>
           </p:cNvSpPr>
@@ -1136,7 +1136,7 @@
           <a:p>
             <a:r>
               <a:rPr lang="cs-CZ" smtClean="0"/>
-              <a:t>Click to edit Master title style</a:t>
+              <a:t>Kliknutím lze upravit styl</a:t>
             </a:r>
             <a:endParaRPr lang="cs-CZ" dirty="0"/>
           </a:p>
@@ -1144,7 +1144,7 @@
       </p:sp>
       <p:sp>
         <p:nvSpPr>
-          <p:cNvPr id="3" name="Content Placeholder 2"/>
+          <p:cNvPr id="3" name="Zástupný symbol pro obsah 2"/>
           <p:cNvSpPr>
             <a:spLocks noGrp="1"/>
           </p:cNvSpPr>
@@ -1160,35 +1160,35 @@
             <a:pPr lvl="0"/>
             <a:r>
               <a:rPr lang="cs-CZ" smtClean="0"/>
-              <a:t>Click to edit Master text styles</a:t>
+              <a:t>Kliknutím lze upravit styly předlohy textu</a:t>
             </a:r>
           </a:p>
           <a:p>
             <a:pPr lvl="1"/>
             <a:r>
               <a:rPr lang="cs-CZ" smtClean="0"/>
-              <a:t>Second level</a:t>
+              <a:t>Druhá úroveň</a:t>
             </a:r>
           </a:p>
           <a:p>
             <a:pPr lvl="2"/>
             <a:r>
               <a:rPr lang="cs-CZ" smtClean="0"/>
-              <a:t>Third level</a:t>
+              <a:t>Třetí úroveň</a:t>
             </a:r>
           </a:p>
           <a:p>
             <a:pPr lvl="3"/>
             <a:r>
               <a:rPr lang="cs-CZ" smtClean="0"/>
-              <a:t>Fourth level</a:t>
+              <a:t>Čtvrtá úroveň</a:t>
             </a:r>
           </a:p>
           <a:p>
             <a:pPr lvl="4"/>
             <a:r>
               <a:rPr lang="cs-CZ" smtClean="0"/>
-              <a:t>Fifth level</a:t>
+              <a:t>Pátá úroveň</a:t>
             </a:r>
             <a:endParaRPr lang="cs-CZ" dirty="0"/>
           </a:p>
@@ -1196,7 +1196,7 @@
       </p:sp>
       <p:sp>
         <p:nvSpPr>
-          <p:cNvPr id="4" name="Date Placeholder 3"/>
+          <p:cNvPr id="4" name="Zástupný symbol pro datum 3"/>
           <p:cNvSpPr>
             <a:spLocks noGrp="1"/>
           </p:cNvSpPr>
@@ -1219,7 +1219,7 @@
       </p:sp>
       <p:sp>
         <p:nvSpPr>
-          <p:cNvPr id="5" name="Footer Placeholder 4"/>
+          <p:cNvPr id="5" name="Zástupný symbol pro zápatí 4"/>
           <p:cNvSpPr>
             <a:spLocks noGrp="1"/>
           </p:cNvSpPr>
@@ -1238,7 +1238,7 @@
       </p:sp>
       <p:sp>
         <p:nvSpPr>
-          <p:cNvPr id="6" name="Slide Number Placeholder 5"/>
+          <p:cNvPr id="6" name="Zástupný symbol pro číslo snímku 5"/>
           <p:cNvSpPr>
             <a:spLocks noGrp="1"/>
           </p:cNvSpPr>
@@ -1274,7 +1274,7 @@
 
 <file path=ppt/slideLayouts/slideLayout3.xml><?xml version="1.0" encoding="utf-8"?>
 <p:sldLayout xmlns:a="http://schemas.openxmlformats.org/drawingml/2006/main" xmlns:r="http://schemas.openxmlformats.org/officeDocument/2006/relationships" xmlns:p="http://schemas.openxmlformats.org/presentationml/2006/main" type="secHead" preserve="1">
-  <p:cSld name="Section Header">
+  <p:cSld name="Záhlaví části">
     <p:spTree>
       <p:nvGrpSpPr>
         <p:cNvPr id="1" name=""/>
@@ -1291,7 +1291,7 @@
       </p:grpSpPr>
       <p:sp>
         <p:nvSpPr>
-          <p:cNvPr id="2" name="Title 1"/>
+          <p:cNvPr id="2" name="Nadpis 1"/>
           <p:cNvSpPr>
             <a:spLocks noGrp="1"/>
           </p:cNvSpPr>
@@ -1315,7 +1315,7 @@
           <a:p>
             <a:r>
               <a:rPr lang="cs-CZ" smtClean="0"/>
-              <a:t>Click to edit Master title style</a:t>
+              <a:t>Kliknutím lze upravit styl</a:t>
             </a:r>
             <a:endParaRPr lang="cs-CZ" dirty="0"/>
           </a:p>
@@ -1323,7 +1323,7 @@
       </p:sp>
       <p:sp>
         <p:nvSpPr>
-          <p:cNvPr id="3" name="Text Placeholder 2"/>
+          <p:cNvPr id="3" name="Zástupný symbol pro text 2"/>
           <p:cNvSpPr>
             <a:spLocks noGrp="1"/>
           </p:cNvSpPr>
@@ -1435,14 +1435,14 @@
             <a:pPr lvl="0"/>
             <a:r>
               <a:rPr lang="cs-CZ" smtClean="0"/>
-              <a:t>Click to edit Master text styles</a:t>
-            </a:r>
-          </a:p>
-        </p:txBody>
-      </p:sp>
-      <p:sp>
-        <p:nvSpPr>
-          <p:cNvPr id="4" name="Date Placeholder 3"/>
+              <a:t>Kliknutím lze upravit styly předlohy textu</a:t>
+            </a:r>
+          </a:p>
+        </p:txBody>
+      </p:sp>
+      <p:sp>
+        <p:nvSpPr>
+          <p:cNvPr id="4" name="Zástupný symbol pro datum 3"/>
           <p:cNvSpPr>
             <a:spLocks noGrp="1"/>
           </p:cNvSpPr>
@@ -1465,7 +1465,7 @@
       </p:sp>
       <p:sp>
         <p:nvSpPr>
-          <p:cNvPr id="5" name="Footer Placeholder 4"/>
+          <p:cNvPr id="5" name="Zástupný symbol pro zápatí 4"/>
           <p:cNvSpPr>
             <a:spLocks noGrp="1"/>
           </p:cNvSpPr>
@@ -1484,7 +1484,7 @@
       </p:sp>
       <p:sp>
         <p:nvSpPr>
-          <p:cNvPr id="6" name="Slide Number Placeholder 5"/>
+          <p:cNvPr id="6" name="Zástupný symbol pro číslo snímku 5"/>
           <p:cNvSpPr>
             <a:spLocks noGrp="1"/>
           </p:cNvSpPr>
@@ -1520,7 +1520,7 @@
 
 <file path=ppt/slideLayouts/slideLayout4.xml><?xml version="1.0" encoding="utf-8"?>
 <p:sldLayout xmlns:a="http://schemas.openxmlformats.org/drawingml/2006/main" xmlns:r="http://schemas.openxmlformats.org/officeDocument/2006/relationships" xmlns:p="http://schemas.openxmlformats.org/presentationml/2006/main" type="twoObj" preserve="1">
-  <p:cSld name="Two Content">
+  <p:cSld name="Dva obsahy">
     <p:spTree>
       <p:nvGrpSpPr>
         <p:cNvPr id="1" name=""/>
@@ -1537,7 +1537,7 @@
       </p:grpSpPr>
       <p:sp>
         <p:nvSpPr>
-          <p:cNvPr id="2" name="Title 1"/>
+          <p:cNvPr id="2" name="Nadpis 1"/>
           <p:cNvSpPr>
             <a:spLocks noGrp="1"/>
           </p:cNvSpPr>
@@ -1552,7 +1552,7 @@
           <a:p>
             <a:r>
               <a:rPr lang="cs-CZ" smtClean="0"/>
-              <a:t>Click to edit Master title style</a:t>
+              <a:t>Kliknutím lze upravit styl</a:t>
             </a:r>
             <a:endParaRPr lang="cs-CZ" dirty="0"/>
           </a:p>
@@ -1560,7 +1560,7 @@
       </p:sp>
       <p:sp>
         <p:nvSpPr>
-          <p:cNvPr id="3" name="Content Placeholder 2"/>
+          <p:cNvPr id="3" name="Zástupný symbol pro obsah 2"/>
           <p:cNvSpPr>
             <a:spLocks noGrp="1"/>
           </p:cNvSpPr>
@@ -1581,35 +1581,35 @@
             <a:pPr lvl="0"/>
             <a:r>
               <a:rPr lang="cs-CZ" smtClean="0"/>
-              <a:t>Click to edit Master text styles</a:t>
+              <a:t>Kliknutím lze upravit styly předlohy textu</a:t>
             </a:r>
           </a:p>
           <a:p>
             <a:pPr lvl="1"/>
             <a:r>
               <a:rPr lang="cs-CZ" smtClean="0"/>
-              <a:t>Second level</a:t>
+              <a:t>Druhá úroveň</a:t>
             </a:r>
           </a:p>
           <a:p>
             <a:pPr lvl="2"/>
             <a:r>
               <a:rPr lang="cs-CZ" smtClean="0"/>
-              <a:t>Third level</a:t>
+              <a:t>Třetí úroveň</a:t>
             </a:r>
           </a:p>
           <a:p>
             <a:pPr lvl="3"/>
             <a:r>
               <a:rPr lang="cs-CZ" smtClean="0"/>
-              <a:t>Fourth level</a:t>
+              <a:t>Čtvrtá úroveň</a:t>
             </a:r>
           </a:p>
           <a:p>
             <a:pPr lvl="4"/>
             <a:r>
               <a:rPr lang="cs-CZ" smtClean="0"/>
-              <a:t>Fifth level</a:t>
+              <a:t>Pátá úroveň</a:t>
             </a:r>
             <a:endParaRPr lang="cs-CZ" dirty="0"/>
           </a:p>
@@ -1617,7 +1617,7 @@
       </p:sp>
       <p:sp>
         <p:nvSpPr>
-          <p:cNvPr id="4" name="Content Placeholder 3"/>
+          <p:cNvPr id="4" name="Zástupný symbol pro obsah 3"/>
           <p:cNvSpPr>
             <a:spLocks noGrp="1"/>
           </p:cNvSpPr>
@@ -1638,35 +1638,35 @@
             <a:pPr lvl="0"/>
             <a:r>
               <a:rPr lang="cs-CZ" smtClean="0"/>
-              <a:t>Click to edit Master text styles</a:t>
+              <a:t>Kliknutím lze upravit styly předlohy textu</a:t>
             </a:r>
           </a:p>
           <a:p>
             <a:pPr lvl="1"/>
             <a:r>
               <a:rPr lang="cs-CZ" smtClean="0"/>
-              <a:t>Second level</a:t>
+              <a:t>Druhá úroveň</a:t>
             </a:r>
           </a:p>
           <a:p>
             <a:pPr lvl="2"/>
             <a:r>
               <a:rPr lang="cs-CZ" smtClean="0"/>
-              <a:t>Third level</a:t>
+              <a:t>Třetí úroveň</a:t>
             </a:r>
           </a:p>
           <a:p>
             <a:pPr lvl="3"/>
             <a:r>
               <a:rPr lang="cs-CZ" smtClean="0"/>
-              <a:t>Fourth level</a:t>
+              <a:t>Čtvrtá úroveň</a:t>
             </a:r>
           </a:p>
           <a:p>
             <a:pPr lvl="4"/>
             <a:r>
               <a:rPr lang="cs-CZ" smtClean="0"/>
-              <a:t>Fifth level</a:t>
+              <a:t>Pátá úroveň</a:t>
             </a:r>
             <a:endParaRPr lang="cs-CZ" dirty="0"/>
           </a:p>
@@ -1674,7 +1674,7 @@
       </p:sp>
       <p:sp>
         <p:nvSpPr>
-          <p:cNvPr id="5" name="Date Placeholder 4"/>
+          <p:cNvPr id="5" name="Zástupný symbol pro datum 4"/>
           <p:cNvSpPr>
             <a:spLocks noGrp="1"/>
           </p:cNvSpPr>
@@ -1697,7 +1697,7 @@
       </p:sp>
       <p:sp>
         <p:nvSpPr>
-          <p:cNvPr id="6" name="Footer Placeholder 5"/>
+          <p:cNvPr id="6" name="Zástupný symbol pro zápatí 5"/>
           <p:cNvSpPr>
             <a:spLocks noGrp="1"/>
           </p:cNvSpPr>
@@ -1716,7 +1716,7 @@
       </p:sp>
       <p:sp>
         <p:nvSpPr>
-          <p:cNvPr id="7" name="Slide Number Placeholder 6"/>
+          <p:cNvPr id="7" name="Zástupný symbol pro číslo snímku 6"/>
           <p:cNvSpPr>
             <a:spLocks noGrp="1"/>
           </p:cNvSpPr>
@@ -1752,7 +1752,7 @@
 
 <file path=ppt/slideLayouts/slideLayout5.xml><?xml version="1.0" encoding="utf-8"?>
 <p:sldLayout xmlns:a="http://schemas.openxmlformats.org/drawingml/2006/main" xmlns:r="http://schemas.openxmlformats.org/officeDocument/2006/relationships" xmlns:p="http://schemas.openxmlformats.org/presentationml/2006/main" type="twoTxTwoObj" preserve="1">
-  <p:cSld name="Comparison">
+  <p:cSld name="Porovnání">
     <p:spTree>
       <p:nvGrpSpPr>
         <p:cNvPr id="1" name=""/>
@@ -1769,7 +1769,7 @@
       </p:grpSpPr>
       <p:sp>
         <p:nvSpPr>
-          <p:cNvPr id="2" name="Title 1"/>
+          <p:cNvPr id="2" name="Nadpis 1"/>
           <p:cNvSpPr>
             <a:spLocks noGrp="1"/>
           </p:cNvSpPr>
@@ -1789,7 +1789,7 @@
           <a:p>
             <a:r>
               <a:rPr lang="cs-CZ" smtClean="0"/>
-              <a:t>Click to edit Master title style</a:t>
+              <a:t>Kliknutím lze upravit styl</a:t>
             </a:r>
             <a:endParaRPr lang="cs-CZ" dirty="0"/>
           </a:p>
@@ -1797,7 +1797,7 @@
       </p:sp>
       <p:sp>
         <p:nvSpPr>
-          <p:cNvPr id="3" name="Text Placeholder 2"/>
+          <p:cNvPr id="3" name="Zástupný symbol pro text 2"/>
           <p:cNvSpPr>
             <a:spLocks noGrp="1"/>
           </p:cNvSpPr>
@@ -1855,14 +1855,14 @@
             <a:pPr lvl="0"/>
             <a:r>
               <a:rPr lang="cs-CZ" smtClean="0"/>
-              <a:t>Click to edit Master text styles</a:t>
-            </a:r>
-          </a:p>
-        </p:txBody>
-      </p:sp>
-      <p:sp>
-        <p:nvSpPr>
-          <p:cNvPr id="4" name="Content Placeholder 3"/>
+              <a:t>Kliknutím lze upravit styly předlohy textu</a:t>
+            </a:r>
+          </a:p>
+        </p:txBody>
+      </p:sp>
+      <p:sp>
+        <p:nvSpPr>
+          <p:cNvPr id="4" name="Zástupný symbol pro obsah 3"/>
           <p:cNvSpPr>
             <a:spLocks noGrp="1"/>
           </p:cNvSpPr>
@@ -1883,35 +1883,35 @@
             <a:pPr lvl="0"/>
             <a:r>
               <a:rPr lang="cs-CZ" smtClean="0"/>
-              <a:t>Click to edit Master text styles</a:t>
+              <a:t>Kliknutím lze upravit styly předlohy textu</a:t>
             </a:r>
           </a:p>
           <a:p>
             <a:pPr lvl="1"/>
             <a:r>
               <a:rPr lang="cs-CZ" smtClean="0"/>
-              <a:t>Second level</a:t>
+              <a:t>Druhá úroveň</a:t>
             </a:r>
           </a:p>
           <a:p>
             <a:pPr lvl="2"/>
             <a:r>
               <a:rPr lang="cs-CZ" smtClean="0"/>
-              <a:t>Third level</a:t>
+              <a:t>Třetí úroveň</a:t>
             </a:r>
           </a:p>
           <a:p>
             <a:pPr lvl="3"/>
             <a:r>
               <a:rPr lang="cs-CZ" smtClean="0"/>
-              <a:t>Fourth level</a:t>
+              <a:t>Čtvrtá úroveň</a:t>
             </a:r>
           </a:p>
           <a:p>
             <a:pPr lvl="4"/>
             <a:r>
               <a:rPr lang="cs-CZ" smtClean="0"/>
-              <a:t>Fifth level</a:t>
+              <a:t>Pátá úroveň</a:t>
             </a:r>
             <a:endParaRPr lang="cs-CZ" dirty="0"/>
           </a:p>
@@ -1919,7 +1919,7 @@
       </p:sp>
       <p:sp>
         <p:nvSpPr>
-          <p:cNvPr id="5" name="Text Placeholder 4"/>
+          <p:cNvPr id="5" name="Zástupný symbol pro text 4"/>
           <p:cNvSpPr>
             <a:spLocks noGrp="1"/>
           </p:cNvSpPr>
@@ -1977,14 +1977,14 @@
             <a:pPr lvl="0"/>
             <a:r>
               <a:rPr lang="cs-CZ" smtClean="0"/>
-              <a:t>Click to edit Master text styles</a:t>
-            </a:r>
-          </a:p>
-        </p:txBody>
-      </p:sp>
-      <p:sp>
-        <p:nvSpPr>
-          <p:cNvPr id="6" name="Content Placeholder 5"/>
+              <a:t>Kliknutím lze upravit styly předlohy textu</a:t>
+            </a:r>
+          </a:p>
+        </p:txBody>
+      </p:sp>
+      <p:sp>
+        <p:nvSpPr>
+          <p:cNvPr id="6" name="Zástupný symbol pro obsah 5"/>
           <p:cNvSpPr>
             <a:spLocks noGrp="1"/>
           </p:cNvSpPr>
@@ -2005,35 +2005,35 @@
             <a:pPr lvl="0"/>
             <a:r>
               <a:rPr lang="cs-CZ" smtClean="0"/>
-              <a:t>Click to edit Master text styles</a:t>
+              <a:t>Kliknutím lze upravit styly předlohy textu</a:t>
             </a:r>
           </a:p>
           <a:p>
             <a:pPr lvl="1"/>
             <a:r>
               <a:rPr lang="cs-CZ" smtClean="0"/>
-              <a:t>Second level</a:t>
+              <a:t>Druhá úroveň</a:t>
             </a:r>
           </a:p>
           <a:p>
             <a:pPr lvl="2"/>
             <a:r>
               <a:rPr lang="cs-CZ" smtClean="0"/>
-              <a:t>Third level</a:t>
+              <a:t>Třetí úroveň</a:t>
             </a:r>
           </a:p>
           <a:p>
             <a:pPr lvl="3"/>
             <a:r>
               <a:rPr lang="cs-CZ" smtClean="0"/>
-              <a:t>Fourth level</a:t>
+              <a:t>Čtvrtá úroveň</a:t>
             </a:r>
           </a:p>
           <a:p>
             <a:pPr lvl="4"/>
             <a:r>
               <a:rPr lang="cs-CZ" smtClean="0"/>
-              <a:t>Fifth level</a:t>
+              <a:t>Pátá úroveň</a:t>
             </a:r>
             <a:endParaRPr lang="cs-CZ" dirty="0"/>
           </a:p>
@@ -2041,7 +2041,7 @@
       </p:sp>
       <p:sp>
         <p:nvSpPr>
-          <p:cNvPr id="7" name="Date Placeholder 6"/>
+          <p:cNvPr id="7" name="Zástupný symbol pro datum 6"/>
           <p:cNvSpPr>
             <a:spLocks noGrp="1"/>
           </p:cNvSpPr>
@@ -2064,7 +2064,7 @@
       </p:sp>
       <p:sp>
         <p:nvSpPr>
-          <p:cNvPr id="8" name="Footer Placeholder 7"/>
+          <p:cNvPr id="8" name="Zástupný symbol pro zápatí 7"/>
           <p:cNvSpPr>
             <a:spLocks noGrp="1"/>
           </p:cNvSpPr>
@@ -2083,7 +2083,7 @@
       </p:sp>
       <p:sp>
         <p:nvSpPr>
-          <p:cNvPr id="9" name="Slide Number Placeholder 8"/>
+          <p:cNvPr id="9" name="Zástupný symbol pro číslo snímku 8"/>
           <p:cNvSpPr>
             <a:spLocks noGrp="1"/>
           </p:cNvSpPr>
@@ -2119,7 +2119,7 @@
 
 <file path=ppt/slideLayouts/slideLayout6.xml><?xml version="1.0" encoding="utf-8"?>
 <p:sldLayout xmlns:a="http://schemas.openxmlformats.org/drawingml/2006/main" xmlns:r="http://schemas.openxmlformats.org/officeDocument/2006/relationships" xmlns:p="http://schemas.openxmlformats.org/presentationml/2006/main" type="titleOnly" preserve="1">
-  <p:cSld name="Title Only">
+  <p:cSld name="Pouze nadpis">
     <p:spTree>
       <p:nvGrpSpPr>
         <p:cNvPr id="1" name=""/>
@@ -2136,7 +2136,7 @@
       </p:grpSpPr>
       <p:sp>
         <p:nvSpPr>
-          <p:cNvPr id="2" name="Title 1"/>
+          <p:cNvPr id="2" name="Nadpis 1"/>
           <p:cNvSpPr>
             <a:spLocks noGrp="1"/>
           </p:cNvSpPr>
@@ -2151,7 +2151,7 @@
           <a:p>
             <a:r>
               <a:rPr lang="cs-CZ" smtClean="0"/>
-              <a:t>Click to edit Master title style</a:t>
+              <a:t>Kliknutím lze upravit styl</a:t>
             </a:r>
             <a:endParaRPr lang="cs-CZ" dirty="0"/>
           </a:p>
@@ -2159,7 +2159,7 @@
       </p:sp>
       <p:sp>
         <p:nvSpPr>
-          <p:cNvPr id="3" name="Date Placeholder 2"/>
+          <p:cNvPr id="3" name="Zástupný symbol pro datum 2"/>
           <p:cNvSpPr>
             <a:spLocks noGrp="1"/>
           </p:cNvSpPr>
@@ -2182,7 +2182,7 @@
       </p:sp>
       <p:sp>
         <p:nvSpPr>
-          <p:cNvPr id="4" name="Footer Placeholder 3"/>
+          <p:cNvPr id="4" name="Zástupný symbol pro zápatí 3"/>
           <p:cNvSpPr>
             <a:spLocks noGrp="1"/>
           </p:cNvSpPr>
@@ -2201,7 +2201,7 @@
       </p:sp>
       <p:sp>
         <p:nvSpPr>
-          <p:cNvPr id="5" name="Slide Number Placeholder 4"/>
+          <p:cNvPr id="5" name="Zástupný symbol pro číslo snímku 4"/>
           <p:cNvSpPr>
             <a:spLocks noGrp="1"/>
           </p:cNvSpPr>
@@ -2237,7 +2237,7 @@
 
 <file path=ppt/slideLayouts/slideLayout7.xml><?xml version="1.0" encoding="utf-8"?>
 <p:sldLayout xmlns:a="http://schemas.openxmlformats.org/drawingml/2006/main" xmlns:r="http://schemas.openxmlformats.org/officeDocument/2006/relationships" xmlns:p="http://schemas.openxmlformats.org/presentationml/2006/main" type="blank" preserve="1">
-  <p:cSld name="Blank">
+  <p:cSld name="Prázdný">
     <p:spTree>
       <p:nvGrpSpPr>
         <p:cNvPr id="1" name=""/>
@@ -2254,7 +2254,7 @@
       </p:grpSpPr>
       <p:sp>
         <p:nvSpPr>
-          <p:cNvPr id="2" name="Date Placeholder 1"/>
+          <p:cNvPr id="2" name="Zástupný symbol pro datum 1"/>
           <p:cNvSpPr>
             <a:spLocks noGrp="1"/>
           </p:cNvSpPr>
@@ -2277,7 +2277,7 @@
       </p:sp>
       <p:sp>
         <p:nvSpPr>
-          <p:cNvPr id="3" name="Footer Placeholder 2"/>
+          <p:cNvPr id="3" name="Zástupný symbol pro zápatí 2"/>
           <p:cNvSpPr>
             <a:spLocks noGrp="1"/>
           </p:cNvSpPr>
@@ -2296,7 +2296,7 @@
       </p:sp>
       <p:sp>
         <p:nvSpPr>
-          <p:cNvPr id="4" name="Slide Number Placeholder 3"/>
+          <p:cNvPr id="4" name="Zástupný symbol pro číslo snímku 3"/>
           <p:cNvSpPr>
             <a:spLocks noGrp="1"/>
           </p:cNvSpPr>
@@ -2332,7 +2332,7 @@
 
 <file path=ppt/slideLayouts/slideLayout8.xml><?xml version="1.0" encoding="utf-8"?>
 <p:sldLayout xmlns:a="http://schemas.openxmlformats.org/drawingml/2006/main" xmlns:r="http://schemas.openxmlformats.org/officeDocument/2006/relationships" xmlns:p="http://schemas.openxmlformats.org/presentationml/2006/main" type="objTx" preserve="1">
-  <p:cSld name="Content with Caption">
+  <p:cSld name="Obsah s titulkem">
     <p:spTree>
       <p:nvGrpSpPr>
         <p:cNvPr id="1" name=""/>
@@ -2349,7 +2349,7 @@
       </p:grpSpPr>
       <p:sp>
         <p:nvSpPr>
-          <p:cNvPr id="2" name="Title 1"/>
+          <p:cNvPr id="2" name="Nadpis 1"/>
           <p:cNvSpPr>
             <a:spLocks noGrp="1"/>
           </p:cNvSpPr>
@@ -2373,7 +2373,7 @@
           <a:p>
             <a:r>
               <a:rPr lang="cs-CZ" smtClean="0"/>
-              <a:t>Click to edit Master title style</a:t>
+              <a:t>Kliknutím lze upravit styl</a:t>
             </a:r>
             <a:endParaRPr lang="cs-CZ" dirty="0"/>
           </a:p>
@@ -2381,7 +2381,7 @@
       </p:sp>
       <p:sp>
         <p:nvSpPr>
-          <p:cNvPr id="3" name="Content Placeholder 2"/>
+          <p:cNvPr id="3" name="Zástupný symbol pro obsah 2"/>
           <p:cNvSpPr>
             <a:spLocks noGrp="1"/>
           </p:cNvSpPr>
@@ -2430,35 +2430,35 @@
             <a:pPr lvl="0"/>
             <a:r>
               <a:rPr lang="cs-CZ" smtClean="0"/>
-              <a:t>Click to edit Master text styles</a:t>
+              <a:t>Kliknutím lze upravit styly předlohy textu</a:t>
             </a:r>
           </a:p>
           <a:p>
             <a:pPr lvl="1"/>
             <a:r>
               <a:rPr lang="cs-CZ" smtClean="0"/>
-              <a:t>Second level</a:t>
+              <a:t>Druhá úroveň</a:t>
             </a:r>
           </a:p>
           <a:p>
             <a:pPr lvl="2"/>
             <a:r>
               <a:rPr lang="cs-CZ" smtClean="0"/>
-              <a:t>Third level</a:t>
+              <a:t>Třetí úroveň</a:t>
             </a:r>
           </a:p>
           <a:p>
             <a:pPr lvl="3"/>
             <a:r>
               <a:rPr lang="cs-CZ" smtClean="0"/>
-              <a:t>Fourth level</a:t>
+              <a:t>Čtvrtá úroveň</a:t>
             </a:r>
           </a:p>
           <a:p>
             <a:pPr lvl="4"/>
             <a:r>
               <a:rPr lang="cs-CZ" smtClean="0"/>
-              <a:t>Fifth level</a:t>
+              <a:t>Pátá úroveň</a:t>
             </a:r>
             <a:endParaRPr lang="cs-CZ" dirty="0"/>
           </a:p>
@@ -2466,7 +2466,7 @@
       </p:sp>
       <p:sp>
         <p:nvSpPr>
-          <p:cNvPr id="4" name="Text Placeholder 3"/>
+          <p:cNvPr id="4" name="Zástupný symbol pro text 3"/>
           <p:cNvSpPr>
             <a:spLocks noGrp="1"/>
           </p:cNvSpPr>
@@ -2524,14 +2524,14 @@
             <a:pPr lvl="0"/>
             <a:r>
               <a:rPr lang="cs-CZ" smtClean="0"/>
-              <a:t>Click to edit Master text styles</a:t>
-            </a:r>
-          </a:p>
-        </p:txBody>
-      </p:sp>
-      <p:sp>
-        <p:nvSpPr>
-          <p:cNvPr id="5" name="Date Placeholder 4"/>
+              <a:t>Kliknutím lze upravit styly předlohy textu</a:t>
+            </a:r>
+          </a:p>
+        </p:txBody>
+      </p:sp>
+      <p:sp>
+        <p:nvSpPr>
+          <p:cNvPr id="5" name="Zástupný symbol pro datum 4"/>
           <p:cNvSpPr>
             <a:spLocks noGrp="1"/>
           </p:cNvSpPr>
@@ -2554,7 +2554,7 @@
       </p:sp>
       <p:sp>
         <p:nvSpPr>
-          <p:cNvPr id="6" name="Footer Placeholder 5"/>
+          <p:cNvPr id="6" name="Zástupný symbol pro zápatí 5"/>
           <p:cNvSpPr>
             <a:spLocks noGrp="1"/>
           </p:cNvSpPr>
@@ -2573,7 +2573,7 @@
       </p:sp>
       <p:sp>
         <p:nvSpPr>
-          <p:cNvPr id="7" name="Slide Number Placeholder 6"/>
+          <p:cNvPr id="7" name="Zástupný symbol pro číslo snímku 6"/>
           <p:cNvSpPr>
             <a:spLocks noGrp="1"/>
           </p:cNvSpPr>
@@ -2609,7 +2609,7 @@
 
 <file path=ppt/slideLayouts/slideLayout9.xml><?xml version="1.0" encoding="utf-8"?>
 <p:sldLayout xmlns:a="http://schemas.openxmlformats.org/drawingml/2006/main" xmlns:r="http://schemas.openxmlformats.org/officeDocument/2006/relationships" xmlns:p="http://schemas.openxmlformats.org/presentationml/2006/main" type="picTx" preserve="1">
-  <p:cSld name="Picture with Caption">
+  <p:cSld name="Obrázek s titulkem">
     <p:spTree>
       <p:nvGrpSpPr>
         <p:cNvPr id="1" name=""/>
@@ -2626,7 +2626,7 @@
       </p:grpSpPr>
       <p:sp>
         <p:nvSpPr>
-          <p:cNvPr id="2" name="Title 1"/>
+          <p:cNvPr id="2" name="Nadpis 1"/>
           <p:cNvSpPr>
             <a:spLocks noGrp="1"/>
           </p:cNvSpPr>
@@ -2650,7 +2650,7 @@
           <a:p>
             <a:r>
               <a:rPr lang="cs-CZ" smtClean="0"/>
-              <a:t>Click to edit Master title style</a:t>
+              <a:t>Kliknutím lze upravit styl</a:t>
             </a:r>
             <a:endParaRPr lang="cs-CZ" dirty="0"/>
           </a:p>
@@ -2658,7 +2658,7 @@
       </p:sp>
       <p:sp>
         <p:nvSpPr>
-          <p:cNvPr id="3" name="Picture Placeholder 2"/>
+          <p:cNvPr id="3" name="Zástupný symbol pro obrázek 2"/>
           <p:cNvSpPr>
             <a:spLocks noGrp="1" noChangeAspect="1"/>
           </p:cNvSpPr>
@@ -2715,7 +2715,7 @@
           <a:p>
             <a:r>
               <a:rPr lang="cs-CZ" smtClean="0"/>
-              <a:t>Click icon to add picture</a:t>
+              <a:t>Kliknutím lze upravit styly předlohy textu</a:t>
             </a:r>
             <a:endParaRPr lang="cs-CZ" dirty="0"/>
           </a:p>
@@ -2723,7 +2723,7 @@
       </p:sp>
       <p:sp>
         <p:nvSpPr>
-          <p:cNvPr id="4" name="Text Placeholder 3"/>
+          <p:cNvPr id="4" name="Zástupný symbol pro text 3"/>
           <p:cNvSpPr>
             <a:spLocks noGrp="1"/>
           </p:cNvSpPr>
@@ -2781,14 +2781,14 @@
             <a:pPr lvl="0"/>
             <a:r>
               <a:rPr lang="cs-CZ" smtClean="0"/>
-              <a:t>Click to edit Master text styles</a:t>
-            </a:r>
-          </a:p>
-        </p:txBody>
-      </p:sp>
-      <p:sp>
-        <p:nvSpPr>
-          <p:cNvPr id="5" name="Date Placeholder 4"/>
+              <a:t>Kliknutím lze upravit styly předlohy textu</a:t>
+            </a:r>
+          </a:p>
+        </p:txBody>
+      </p:sp>
+      <p:sp>
+        <p:nvSpPr>
+          <p:cNvPr id="5" name="Zástupný symbol pro datum 4"/>
           <p:cNvSpPr>
             <a:spLocks noGrp="1"/>
           </p:cNvSpPr>
@@ -2811,7 +2811,7 @@
       </p:sp>
       <p:sp>
         <p:nvSpPr>
-          <p:cNvPr id="6" name="Footer Placeholder 5"/>
+          <p:cNvPr id="6" name="Zástupný symbol pro zápatí 5"/>
           <p:cNvSpPr>
             <a:spLocks noGrp="1"/>
           </p:cNvSpPr>
@@ -2830,7 +2830,7 @@
       </p:sp>
       <p:sp>
         <p:nvSpPr>
-          <p:cNvPr id="7" name="Slide Number Placeholder 6"/>
+          <p:cNvPr id="7" name="Zástupný symbol pro číslo snímku 6"/>
           <p:cNvSpPr>
             <a:spLocks noGrp="1"/>
           </p:cNvSpPr>
@@ -3423,7 +3423,7 @@
       </p:grpSpPr>
       <p:sp>
         <p:nvSpPr>
-          <p:cNvPr id="2" name="Title 1"/>
+          <p:cNvPr id="2" name="Nadpis 1"/>
           <p:cNvSpPr>
             <a:spLocks noGrp="1"/>
           </p:cNvSpPr>
@@ -3442,7 +3442,7 @@
       </p:sp>
       <p:sp>
         <p:nvSpPr>
-          <p:cNvPr id="3" name="Subtitle 2"/>
+          <p:cNvPr id="3" name="Podnadpis 2"/>
           <p:cNvSpPr>
             <a:spLocks noGrp="1"/>
           </p:cNvSpPr>

</xml_diff>